<commit_message>
WALL : affichage du mur utilisateur avec gestion des données. ADMIN : affichage du mur administrateur (gestion des donnée incomplet) Relations des tables completé (a tester)
</commit_message>
<xml_diff>
--- a/Documents/base_de_donnee_schema.pptx
+++ b/Documents/base_de_donnee_schema.pptx
@@ -243,7 +243,7 @@
           <a:p>
             <a:fld id="{C44E30F8-CE0D-476C-B2FF-E5AF19B0A86C}" type="datetimeFigureOut">
               <a:rPr lang="fr-CH" smtClean="0"/>
-              <a:t>19.09.2014</a:t>
+              <a:t>27.09.2014</a:t>
             </a:fld>
             <a:endParaRPr lang="fr-CH"/>
           </a:p>
@@ -413,7 +413,7 @@
           <a:p>
             <a:fld id="{C44E30F8-CE0D-476C-B2FF-E5AF19B0A86C}" type="datetimeFigureOut">
               <a:rPr lang="fr-CH" smtClean="0"/>
-              <a:t>19.09.2014</a:t>
+              <a:t>27.09.2014</a:t>
             </a:fld>
             <a:endParaRPr lang="fr-CH"/>
           </a:p>
@@ -593,7 +593,7 @@
           <a:p>
             <a:fld id="{C44E30F8-CE0D-476C-B2FF-E5AF19B0A86C}" type="datetimeFigureOut">
               <a:rPr lang="fr-CH" smtClean="0"/>
-              <a:t>19.09.2014</a:t>
+              <a:t>27.09.2014</a:t>
             </a:fld>
             <a:endParaRPr lang="fr-CH"/>
           </a:p>
@@ -763,7 +763,7 @@
           <a:p>
             <a:fld id="{C44E30F8-CE0D-476C-B2FF-E5AF19B0A86C}" type="datetimeFigureOut">
               <a:rPr lang="fr-CH" smtClean="0"/>
-              <a:t>19.09.2014</a:t>
+              <a:t>27.09.2014</a:t>
             </a:fld>
             <a:endParaRPr lang="fr-CH"/>
           </a:p>
@@ -1009,7 +1009,7 @@
           <a:p>
             <a:fld id="{C44E30F8-CE0D-476C-B2FF-E5AF19B0A86C}" type="datetimeFigureOut">
               <a:rPr lang="fr-CH" smtClean="0"/>
-              <a:t>19.09.2014</a:t>
+              <a:t>27.09.2014</a:t>
             </a:fld>
             <a:endParaRPr lang="fr-CH"/>
           </a:p>
@@ -1241,7 +1241,7 @@
           <a:p>
             <a:fld id="{C44E30F8-CE0D-476C-B2FF-E5AF19B0A86C}" type="datetimeFigureOut">
               <a:rPr lang="fr-CH" smtClean="0"/>
-              <a:t>19.09.2014</a:t>
+              <a:t>27.09.2014</a:t>
             </a:fld>
             <a:endParaRPr lang="fr-CH"/>
           </a:p>
@@ -1608,7 +1608,7 @@
           <a:p>
             <a:fld id="{C44E30F8-CE0D-476C-B2FF-E5AF19B0A86C}" type="datetimeFigureOut">
               <a:rPr lang="fr-CH" smtClean="0"/>
-              <a:t>19.09.2014</a:t>
+              <a:t>27.09.2014</a:t>
             </a:fld>
             <a:endParaRPr lang="fr-CH"/>
           </a:p>
@@ -1726,7 +1726,7 @@
           <a:p>
             <a:fld id="{C44E30F8-CE0D-476C-B2FF-E5AF19B0A86C}" type="datetimeFigureOut">
               <a:rPr lang="fr-CH" smtClean="0"/>
-              <a:t>19.09.2014</a:t>
+              <a:t>27.09.2014</a:t>
             </a:fld>
             <a:endParaRPr lang="fr-CH"/>
           </a:p>
@@ -1821,7 +1821,7 @@
           <a:p>
             <a:fld id="{C44E30F8-CE0D-476C-B2FF-E5AF19B0A86C}" type="datetimeFigureOut">
               <a:rPr lang="fr-CH" smtClean="0"/>
-              <a:t>19.09.2014</a:t>
+              <a:t>27.09.2014</a:t>
             </a:fld>
             <a:endParaRPr lang="fr-CH"/>
           </a:p>
@@ -2098,7 +2098,7 @@
           <a:p>
             <a:fld id="{C44E30F8-CE0D-476C-B2FF-E5AF19B0A86C}" type="datetimeFigureOut">
               <a:rPr lang="fr-CH" smtClean="0"/>
-              <a:t>19.09.2014</a:t>
+              <a:t>27.09.2014</a:t>
             </a:fld>
             <a:endParaRPr lang="fr-CH"/>
           </a:p>
@@ -2351,7 +2351,7 @@
           <a:p>
             <a:fld id="{C44E30F8-CE0D-476C-B2FF-E5AF19B0A86C}" type="datetimeFigureOut">
               <a:rPr lang="fr-CH" smtClean="0"/>
-              <a:t>19.09.2014</a:t>
+              <a:t>27.09.2014</a:t>
             </a:fld>
             <a:endParaRPr lang="fr-CH"/>
           </a:p>
@@ -2564,7 +2564,7 @@
           <a:p>
             <a:fld id="{C44E30F8-CE0D-476C-B2FF-E5AF19B0A86C}" type="datetimeFigureOut">
               <a:rPr lang="fr-CH" smtClean="0"/>
-              <a:t>19.09.2014</a:t>
+              <a:t>27.09.2014</a:t>
             </a:fld>
             <a:endParaRPr lang="fr-CH"/>
           </a:p>
@@ -3243,11 +3243,7 @@
                     <a:p>
                       <a:r>
                         <a:rPr lang="fr-CH" sz="1400" dirty="0" err="1" smtClean="0"/>
-                        <a:t>subscription</a:t>
-                      </a:r>
-                      <a:r>
-                        <a:rPr lang="fr-CH" sz="1400" dirty="0" err="1" smtClean="0"/>
-                        <a:t>_date</a:t>
+                        <a:t>subscription_date</a:t>
                       </a:r>
                       <a:endParaRPr lang="fr-CH" sz="1400" dirty="0" smtClean="0"/>
                     </a:p>
@@ -3300,13 +3296,13 @@
           <p:nvPr>
             <p:extLst>
               <p:ext uri="{D42A27DB-BD31-4B8C-83A1-F6EECF244321}">
-                <p14:modId xmlns:p14="http://schemas.microsoft.com/office/powerpoint/2010/main" val="836171831"/>
+                <p14:modId xmlns:p14="http://schemas.microsoft.com/office/powerpoint/2010/main" val="4200957027"/>
               </p:ext>
             </p:extLst>
           </p:nvPr>
         </p:nvGraphicFramePr>
         <p:xfrm>
-          <a:off x="3499631" y="1398159"/>
+          <a:off x="3499631" y="1297951"/>
           <a:ext cx="1512866" cy="3291840"/>
         </p:xfrm>
         <a:graphic>
@@ -3506,7 +3502,7 @@
           <p:nvPr>
             <p:extLst>
               <p:ext uri="{D42A27DB-BD31-4B8C-83A1-F6EECF244321}">
-                <p14:modId xmlns:p14="http://schemas.microsoft.com/office/powerpoint/2010/main" val="2863871764"/>
+                <p14:modId xmlns:p14="http://schemas.microsoft.com/office/powerpoint/2010/main" val="3629715505"/>
               </p:ext>
             </p:extLst>
           </p:nvPr>
@@ -3763,7 +3759,7 @@
         </p:nvSpPr>
         <p:spPr>
           <a:xfrm>
-            <a:off x="5237967" y="1415440"/>
+            <a:off x="5237967" y="1427966"/>
             <a:ext cx="977029" cy="313151"/>
           </a:xfrm>
           <a:prstGeom prst="flowChartPreparation">

</xml_diff>